<commit_message>
work on recursion on real twitter demo
</commit_message>
<xml_diff>
--- a/book_contents/ch14_moderation/06_tweets_and_replies/conversation diagrams.pptx
+++ b/book_contents/ch14_moderation/06_tweets_and_replies/conversation diagrams.pptx
@@ -7,6 +7,7 @@
   <p:sldIdLst>
     <p:sldId id="256" r:id="rId2"/>
     <p:sldId id="257" r:id="rId3"/>
+    <p:sldId id="258" r:id="rId4"/>
   </p:sldIdLst>
   <p:sldSz cx="12192000" cy="6858000"/>
   <p:notesSz cx="6858000" cy="9144000"/>
@@ -105,6 +106,11 @@
       </a:defRPr>
     </a:lvl9pPr>
   </p:defaultTextStyle>
+  <p:extLst>
+    <p:ext uri="{EFAFB233-063F-42B5-8137-9DF3F51BA10A}">
+      <p15:sldGuideLst xmlns:p15="http://schemas.microsoft.com/office/powerpoint/2012/main"/>
+    </p:ext>
+  </p:extLst>
 </p:presentation>
 </file>
 
@@ -255,7 +261,7 @@
           <a:p>
             <a:fld id="{25EEA6D2-D873-4C98-8CE6-BA0C29D9469F}" type="datetimeFigureOut">
               <a:rPr lang="en-US" smtClean="0"/>
-              <a:t>11/7/2022</a:t>
+              <a:t>11/11/2022</a:t>
             </a:fld>
             <a:endParaRPr lang="en-US"/>
           </a:p>
@@ -453,7 +459,7 @@
           <a:p>
             <a:fld id="{25EEA6D2-D873-4C98-8CE6-BA0C29D9469F}" type="datetimeFigureOut">
               <a:rPr lang="en-US" smtClean="0"/>
-              <a:t>11/7/2022</a:t>
+              <a:t>11/11/2022</a:t>
             </a:fld>
             <a:endParaRPr lang="en-US"/>
           </a:p>
@@ -661,7 +667,7 @@
           <a:p>
             <a:fld id="{25EEA6D2-D873-4C98-8CE6-BA0C29D9469F}" type="datetimeFigureOut">
               <a:rPr lang="en-US" smtClean="0"/>
-              <a:t>11/7/2022</a:t>
+              <a:t>11/11/2022</a:t>
             </a:fld>
             <a:endParaRPr lang="en-US"/>
           </a:p>
@@ -859,7 +865,7 @@
           <a:p>
             <a:fld id="{25EEA6D2-D873-4C98-8CE6-BA0C29D9469F}" type="datetimeFigureOut">
               <a:rPr lang="en-US" smtClean="0"/>
-              <a:t>11/7/2022</a:t>
+              <a:t>11/11/2022</a:t>
             </a:fld>
             <a:endParaRPr lang="en-US"/>
           </a:p>
@@ -1134,7 +1140,7 @@
           <a:p>
             <a:fld id="{25EEA6D2-D873-4C98-8CE6-BA0C29D9469F}" type="datetimeFigureOut">
               <a:rPr lang="en-US" smtClean="0"/>
-              <a:t>11/7/2022</a:t>
+              <a:t>11/11/2022</a:t>
             </a:fld>
             <a:endParaRPr lang="en-US"/>
           </a:p>
@@ -1399,7 +1405,7 @@
           <a:p>
             <a:fld id="{25EEA6D2-D873-4C98-8CE6-BA0C29D9469F}" type="datetimeFigureOut">
               <a:rPr lang="en-US" smtClean="0"/>
-              <a:t>11/7/2022</a:t>
+              <a:t>11/11/2022</a:t>
             </a:fld>
             <a:endParaRPr lang="en-US"/>
           </a:p>
@@ -1811,7 +1817,7 @@
           <a:p>
             <a:fld id="{25EEA6D2-D873-4C98-8CE6-BA0C29D9469F}" type="datetimeFigureOut">
               <a:rPr lang="en-US" smtClean="0"/>
-              <a:t>11/7/2022</a:t>
+              <a:t>11/11/2022</a:t>
             </a:fld>
             <a:endParaRPr lang="en-US"/>
           </a:p>
@@ -1952,7 +1958,7 @@
           <a:p>
             <a:fld id="{25EEA6D2-D873-4C98-8CE6-BA0C29D9469F}" type="datetimeFigureOut">
               <a:rPr lang="en-US" smtClean="0"/>
-              <a:t>11/7/2022</a:t>
+              <a:t>11/11/2022</a:t>
             </a:fld>
             <a:endParaRPr lang="en-US"/>
           </a:p>
@@ -2065,7 +2071,7 @@
           <a:p>
             <a:fld id="{25EEA6D2-D873-4C98-8CE6-BA0C29D9469F}" type="datetimeFigureOut">
               <a:rPr lang="en-US" smtClean="0"/>
-              <a:t>11/7/2022</a:t>
+              <a:t>11/11/2022</a:t>
             </a:fld>
             <a:endParaRPr lang="en-US"/>
           </a:p>
@@ -2376,7 +2382,7 @@
           <a:p>
             <a:fld id="{25EEA6D2-D873-4C98-8CE6-BA0C29D9469F}" type="datetimeFigureOut">
               <a:rPr lang="en-US" smtClean="0"/>
-              <a:t>11/7/2022</a:t>
+              <a:t>11/11/2022</a:t>
             </a:fld>
             <a:endParaRPr lang="en-US"/>
           </a:p>
@@ -2664,7 +2670,7 @@
           <a:p>
             <a:fld id="{25EEA6D2-D873-4C98-8CE6-BA0C29D9469F}" type="datetimeFigureOut">
               <a:rPr lang="en-US" smtClean="0"/>
-              <a:t>11/7/2022</a:t>
+              <a:t>11/11/2022</a:t>
             </a:fld>
             <a:endParaRPr lang="en-US"/>
           </a:p>
@@ -2905,7 +2911,7 @@
           <a:p>
             <a:fld id="{25EEA6D2-D873-4C98-8CE6-BA0C29D9469F}" type="datetimeFigureOut">
               <a:rPr lang="en-US" smtClean="0"/>
-              <a:t>11/7/2022</a:t>
+              <a:t>11/11/2022</a:t>
             </a:fld>
             <a:endParaRPr lang="en-US"/>
           </a:p>
@@ -5610,6 +5616,1499 @@
 </p:sld>
 </file>
 
+<file path=ppt/slides/slide3.xml><?xml version="1.0" encoding="utf-8"?>
+<p:sld xmlns:a="http://schemas.openxmlformats.org/drawingml/2006/main" xmlns:r="http://schemas.openxmlformats.org/officeDocument/2006/relationships" xmlns:p="http://schemas.openxmlformats.org/presentationml/2006/main">
+  <p:cSld>
+    <p:spTree>
+      <p:nvGrpSpPr>
+        <p:cNvPr id="1" name=""/>
+        <p:cNvGrpSpPr/>
+        <p:nvPr/>
+      </p:nvGrpSpPr>
+      <p:grpSpPr>
+        <a:xfrm>
+          <a:off x="0" y="0"/>
+          <a:ext cx="0" cy="0"/>
+          <a:chOff x="0" y="0"/>
+          <a:chExt cx="0" cy="0"/>
+        </a:xfrm>
+      </p:grpSpPr>
+      <p:sp>
+        <p:nvSpPr>
+          <p:cNvPr id="4" name="TextBox 3">
+            <a:extLst>
+              <a:ext uri="{FF2B5EF4-FFF2-40B4-BE49-F238E27FC236}">
+                <a16:creationId xmlns:a16="http://schemas.microsoft.com/office/drawing/2014/main" id="{F8CEE117-13B0-7933-F152-04EAB77C2442}"/>
+              </a:ext>
+            </a:extLst>
+          </p:cNvPr>
+          <p:cNvSpPr txBox="1"/>
+          <p:nvPr/>
+        </p:nvSpPr>
+        <p:spPr>
+          <a:xfrm>
+            <a:off x="3623276" y="1442066"/>
+            <a:ext cx="3396890" cy="369332"/>
+          </a:xfrm>
+          <a:prstGeom prst="rect">
+            <a:avLst/>
+          </a:prstGeom>
+          <a:noFill/>
+        </p:spPr>
+        <p:txBody>
+          <a:bodyPr wrap="square" rtlCol="0">
+            <a:spAutoFit/>
+          </a:bodyPr>
+          <a:lstStyle/>
+          <a:p>
+            <a:r>
+              <a:rPr lang="en-US" b="1" dirty="0"/>
+              <a:t>That last exam in sure was hard!</a:t>
+            </a:r>
+          </a:p>
+        </p:txBody>
+      </p:sp>
+      <p:sp>
+        <p:nvSpPr>
+          <p:cNvPr id="5" name="TextBox 4">
+            <a:extLst>
+              <a:ext uri="{FF2B5EF4-FFF2-40B4-BE49-F238E27FC236}">
+                <a16:creationId xmlns:a16="http://schemas.microsoft.com/office/drawing/2014/main" id="{C394AE8C-957D-9782-7436-721D418575A9}"/>
+              </a:ext>
+            </a:extLst>
+          </p:cNvPr>
+          <p:cNvSpPr txBox="1"/>
+          <p:nvPr/>
+        </p:nvSpPr>
+        <p:spPr>
+          <a:xfrm>
+            <a:off x="626291" y="2253939"/>
+            <a:ext cx="4232442" cy="369332"/>
+          </a:xfrm>
+          <a:prstGeom prst="rect">
+            <a:avLst/>
+          </a:prstGeom>
+          <a:noFill/>
+        </p:spPr>
+        <p:txBody>
+          <a:bodyPr wrap="square" rtlCol="0">
+            <a:spAutoFit/>
+          </a:bodyPr>
+          <a:lstStyle/>
+          <a:p>
+            <a:r>
+              <a:rPr lang="en-US" b="1" dirty="0"/>
+              <a:t>It sure was hard, what score did you get? </a:t>
+            </a:r>
+          </a:p>
+        </p:txBody>
+      </p:sp>
+      <p:sp>
+        <p:nvSpPr>
+          <p:cNvPr id="6" name="TextBox 5">
+            <a:extLst>
+              <a:ext uri="{FF2B5EF4-FFF2-40B4-BE49-F238E27FC236}">
+                <a16:creationId xmlns:a16="http://schemas.microsoft.com/office/drawing/2014/main" id="{28A33FDD-20A0-487B-DB92-2FD87907701C}"/>
+              </a:ext>
+            </a:extLst>
+          </p:cNvPr>
+          <p:cNvSpPr txBox="1"/>
+          <p:nvPr/>
+        </p:nvSpPr>
+        <p:spPr>
+          <a:xfrm>
+            <a:off x="6238802" y="2253939"/>
+            <a:ext cx="2888581" cy="369332"/>
+          </a:xfrm>
+          <a:prstGeom prst="rect">
+            <a:avLst/>
+          </a:prstGeom>
+          <a:noFill/>
+        </p:spPr>
+        <p:txBody>
+          <a:bodyPr wrap="square" rtlCol="0">
+            <a:spAutoFit/>
+          </a:bodyPr>
+          <a:lstStyle/>
+          <a:p>
+            <a:r>
+              <a:rPr lang="en-US" b="1" dirty="0"/>
+              <a:t>I didn't think it was that bad</a:t>
+            </a:r>
+          </a:p>
+        </p:txBody>
+      </p:sp>
+      <p:sp>
+        <p:nvSpPr>
+          <p:cNvPr id="7" name="TextBox 6">
+            <a:extLst>
+              <a:ext uri="{FF2B5EF4-FFF2-40B4-BE49-F238E27FC236}">
+                <a16:creationId xmlns:a16="http://schemas.microsoft.com/office/drawing/2014/main" id="{70653BAF-3DAF-0E74-177B-CCDC52AFA5A8}"/>
+              </a:ext>
+            </a:extLst>
+          </p:cNvPr>
+          <p:cNvSpPr txBox="1"/>
+          <p:nvPr/>
+        </p:nvSpPr>
+        <p:spPr>
+          <a:xfrm>
+            <a:off x="717589" y="3162710"/>
+            <a:ext cx="1434318" cy="369332"/>
+          </a:xfrm>
+          <a:prstGeom prst="rect">
+            <a:avLst/>
+          </a:prstGeom>
+          <a:noFill/>
+        </p:spPr>
+        <p:txBody>
+          <a:bodyPr wrap="square" rtlCol="0">
+            <a:spAutoFit/>
+          </a:bodyPr>
+          <a:lstStyle/>
+          <a:p>
+            <a:r>
+              <a:rPr lang="en-US" b="1" dirty="0"/>
+              <a:t>I got a 67% :(</a:t>
+            </a:r>
+          </a:p>
+        </p:txBody>
+      </p:sp>
+      <p:sp>
+        <p:nvSpPr>
+          <p:cNvPr id="8" name="TextBox 7">
+            <a:extLst>
+              <a:ext uri="{FF2B5EF4-FFF2-40B4-BE49-F238E27FC236}">
+                <a16:creationId xmlns:a16="http://schemas.microsoft.com/office/drawing/2014/main" id="{945F167B-7EB9-3C3C-0523-7BC62274C94C}"/>
+              </a:ext>
+            </a:extLst>
+          </p:cNvPr>
+          <p:cNvSpPr txBox="1"/>
+          <p:nvPr/>
+        </p:nvSpPr>
+        <p:spPr>
+          <a:xfrm>
+            <a:off x="2366272" y="3164152"/>
+            <a:ext cx="1307957" cy="369332"/>
+          </a:xfrm>
+          <a:prstGeom prst="rect">
+            <a:avLst/>
+          </a:prstGeom>
+          <a:noFill/>
+        </p:spPr>
+        <p:txBody>
+          <a:bodyPr wrap="square" rtlCol="0">
+            <a:spAutoFit/>
+          </a:bodyPr>
+          <a:lstStyle/>
+          <a:p>
+            <a:r>
+              <a:rPr lang="en-US" b="1" dirty="0"/>
+              <a:t>I got a 73%</a:t>
+            </a:r>
+          </a:p>
+        </p:txBody>
+      </p:sp>
+      <p:sp>
+        <p:nvSpPr>
+          <p:cNvPr id="9" name="TextBox 8">
+            <a:extLst>
+              <a:ext uri="{FF2B5EF4-FFF2-40B4-BE49-F238E27FC236}">
+                <a16:creationId xmlns:a16="http://schemas.microsoft.com/office/drawing/2014/main" id="{80B3A475-80EA-450B-8023-ABEB12A9090B}"/>
+              </a:ext>
+            </a:extLst>
+          </p:cNvPr>
+          <p:cNvSpPr txBox="1"/>
+          <p:nvPr/>
+        </p:nvSpPr>
+        <p:spPr>
+          <a:xfrm>
+            <a:off x="3882025" y="3162710"/>
+            <a:ext cx="3885795" cy="369332"/>
+          </a:xfrm>
+          <a:prstGeom prst="rect">
+            <a:avLst/>
+          </a:prstGeom>
+          <a:noFill/>
+        </p:spPr>
+        <p:txBody>
+          <a:bodyPr wrap="square" rtlCol="0">
+            <a:spAutoFit/>
+          </a:bodyPr>
+          <a:lstStyle/>
+          <a:p>
+            <a:r>
+              <a:rPr lang="en-US" b="1" dirty="0"/>
+              <a:t>how was that not a super hard exam?</a:t>
+            </a:r>
+          </a:p>
+        </p:txBody>
+      </p:sp>
+      <p:sp>
+        <p:nvSpPr>
+          <p:cNvPr id="10" name="TextBox 9">
+            <a:extLst>
+              <a:ext uri="{FF2B5EF4-FFF2-40B4-BE49-F238E27FC236}">
+                <a16:creationId xmlns:a16="http://schemas.microsoft.com/office/drawing/2014/main" id="{354A90A2-AEDF-79B8-434C-2DC5A55B0D44}"/>
+              </a:ext>
+            </a:extLst>
+          </p:cNvPr>
+          <p:cNvSpPr txBox="1"/>
+          <p:nvPr/>
+        </p:nvSpPr>
+        <p:spPr>
+          <a:xfrm>
+            <a:off x="7690201" y="3168842"/>
+            <a:ext cx="2126873" cy="369332"/>
+          </a:xfrm>
+          <a:prstGeom prst="rect">
+            <a:avLst/>
+          </a:prstGeom>
+          <a:noFill/>
+        </p:spPr>
+        <p:txBody>
+          <a:bodyPr wrap="square" rtlCol="0">
+            <a:spAutoFit/>
+          </a:bodyPr>
+          <a:lstStyle/>
+          <a:p>
+            <a:r>
+              <a:rPr lang="en-US" b="1" dirty="0"/>
+              <a:t>of course you didn't</a:t>
+            </a:r>
+          </a:p>
+        </p:txBody>
+      </p:sp>
+      <p:cxnSp>
+        <p:nvCxnSpPr>
+          <p:cNvPr id="12" name="Straight Connector 11">
+            <a:extLst>
+              <a:ext uri="{FF2B5EF4-FFF2-40B4-BE49-F238E27FC236}">
+                <a16:creationId xmlns:a16="http://schemas.microsoft.com/office/drawing/2014/main" id="{93B5FB21-35B3-CC89-4DBE-508C5608E4F2}"/>
+              </a:ext>
+            </a:extLst>
+          </p:cNvPr>
+          <p:cNvCxnSpPr>
+            <a:cxnSpLocks/>
+            <a:endCxn id="5" idx="0"/>
+          </p:cNvCxnSpPr>
+          <p:nvPr/>
+        </p:nvCxnSpPr>
+        <p:spPr>
+          <a:xfrm flipH="1">
+            <a:off x="2742512" y="1809543"/>
+            <a:ext cx="1295782" cy="444396"/>
+          </a:xfrm>
+          <a:prstGeom prst="line">
+            <a:avLst/>
+          </a:prstGeom>
+          <a:ln w="19050">
+            <a:prstDash val="solid"/>
+          </a:ln>
+        </p:spPr>
+        <p:style>
+          <a:lnRef idx="1">
+            <a:schemeClr val="dk1"/>
+          </a:lnRef>
+          <a:fillRef idx="0">
+            <a:schemeClr val="dk1"/>
+          </a:fillRef>
+          <a:effectRef idx="0">
+            <a:schemeClr val="dk1"/>
+          </a:effectRef>
+          <a:fontRef idx="minor">
+            <a:schemeClr val="tx1"/>
+          </a:fontRef>
+        </p:style>
+      </p:cxnSp>
+      <p:cxnSp>
+        <p:nvCxnSpPr>
+          <p:cNvPr id="14" name="Straight Connector 13">
+            <a:extLst>
+              <a:ext uri="{FF2B5EF4-FFF2-40B4-BE49-F238E27FC236}">
+                <a16:creationId xmlns:a16="http://schemas.microsoft.com/office/drawing/2014/main" id="{F2C579E3-EEA5-57E2-11B8-DADF374BDF68}"/>
+              </a:ext>
+            </a:extLst>
+          </p:cNvPr>
+          <p:cNvCxnSpPr>
+            <a:cxnSpLocks/>
+          </p:cNvCxnSpPr>
+          <p:nvPr/>
+        </p:nvCxnSpPr>
+        <p:spPr>
+          <a:xfrm flipH="1">
+            <a:off x="1539150" y="2621416"/>
+            <a:ext cx="567247" cy="578984"/>
+          </a:xfrm>
+          <a:prstGeom prst="line">
+            <a:avLst/>
+          </a:prstGeom>
+          <a:ln w="19050">
+            <a:prstDash val="solid"/>
+          </a:ln>
+        </p:spPr>
+        <p:style>
+          <a:lnRef idx="1">
+            <a:schemeClr val="dk1"/>
+          </a:lnRef>
+          <a:fillRef idx="0">
+            <a:schemeClr val="dk1"/>
+          </a:fillRef>
+          <a:effectRef idx="0">
+            <a:schemeClr val="dk1"/>
+          </a:effectRef>
+          <a:fontRef idx="minor">
+            <a:schemeClr val="tx1"/>
+          </a:fontRef>
+        </p:style>
+      </p:cxnSp>
+      <p:cxnSp>
+        <p:nvCxnSpPr>
+          <p:cNvPr id="15" name="Straight Connector 14">
+            <a:extLst>
+              <a:ext uri="{FF2B5EF4-FFF2-40B4-BE49-F238E27FC236}">
+                <a16:creationId xmlns:a16="http://schemas.microsoft.com/office/drawing/2014/main" id="{E8367C24-632F-6BD0-B50C-965336F7D682}"/>
+              </a:ext>
+            </a:extLst>
+          </p:cNvPr>
+          <p:cNvCxnSpPr>
+            <a:cxnSpLocks/>
+          </p:cNvCxnSpPr>
+          <p:nvPr/>
+        </p:nvCxnSpPr>
+        <p:spPr>
+          <a:xfrm>
+            <a:off x="6418053" y="1815525"/>
+            <a:ext cx="1115448" cy="482302"/>
+          </a:xfrm>
+          <a:prstGeom prst="line">
+            <a:avLst/>
+          </a:prstGeom>
+          <a:ln w="19050">
+            <a:prstDash val="solid"/>
+          </a:ln>
+        </p:spPr>
+        <p:style>
+          <a:lnRef idx="1">
+            <a:schemeClr val="dk1"/>
+          </a:lnRef>
+          <a:fillRef idx="0">
+            <a:schemeClr val="dk1"/>
+          </a:fillRef>
+          <a:effectRef idx="0">
+            <a:schemeClr val="dk1"/>
+          </a:effectRef>
+          <a:fontRef idx="minor">
+            <a:schemeClr val="tx1"/>
+          </a:fontRef>
+        </p:style>
+      </p:cxnSp>
+      <p:cxnSp>
+        <p:nvCxnSpPr>
+          <p:cNvPr id="19" name="Straight Connector 18">
+            <a:extLst>
+              <a:ext uri="{FF2B5EF4-FFF2-40B4-BE49-F238E27FC236}">
+                <a16:creationId xmlns:a16="http://schemas.microsoft.com/office/drawing/2014/main" id="{4A010F40-EC58-B1D3-7A35-1E99AE64D04C}"/>
+              </a:ext>
+            </a:extLst>
+          </p:cNvPr>
+          <p:cNvCxnSpPr>
+            <a:cxnSpLocks/>
+          </p:cNvCxnSpPr>
+          <p:nvPr/>
+        </p:nvCxnSpPr>
+        <p:spPr>
+          <a:xfrm>
+            <a:off x="2241065" y="2624504"/>
+            <a:ext cx="524474" cy="575896"/>
+          </a:xfrm>
+          <a:prstGeom prst="line">
+            <a:avLst/>
+          </a:prstGeom>
+          <a:ln w="19050">
+            <a:prstDash val="solid"/>
+          </a:ln>
+        </p:spPr>
+        <p:style>
+          <a:lnRef idx="1">
+            <a:schemeClr val="dk1"/>
+          </a:lnRef>
+          <a:fillRef idx="0">
+            <a:schemeClr val="dk1"/>
+          </a:fillRef>
+          <a:effectRef idx="0">
+            <a:schemeClr val="dk1"/>
+          </a:effectRef>
+          <a:fontRef idx="minor">
+            <a:schemeClr val="tx1"/>
+          </a:fontRef>
+        </p:style>
+      </p:cxnSp>
+      <p:cxnSp>
+        <p:nvCxnSpPr>
+          <p:cNvPr id="22" name="Straight Connector 21">
+            <a:extLst>
+              <a:ext uri="{FF2B5EF4-FFF2-40B4-BE49-F238E27FC236}">
+                <a16:creationId xmlns:a16="http://schemas.microsoft.com/office/drawing/2014/main" id="{3FF94B16-1EA9-67C9-D473-504DB7715550}"/>
+              </a:ext>
+            </a:extLst>
+          </p:cNvPr>
+          <p:cNvCxnSpPr>
+            <a:cxnSpLocks/>
+            <a:endCxn id="9" idx="0"/>
+          </p:cNvCxnSpPr>
+          <p:nvPr/>
+        </p:nvCxnSpPr>
+        <p:spPr>
+          <a:xfrm flipH="1">
+            <a:off x="5824923" y="2595018"/>
+            <a:ext cx="1508832" cy="567692"/>
+          </a:xfrm>
+          <a:prstGeom prst="line">
+            <a:avLst/>
+          </a:prstGeom>
+          <a:ln w="19050">
+            <a:prstDash val="solid"/>
+          </a:ln>
+        </p:spPr>
+        <p:style>
+          <a:lnRef idx="1">
+            <a:schemeClr val="dk1"/>
+          </a:lnRef>
+          <a:fillRef idx="0">
+            <a:schemeClr val="dk1"/>
+          </a:fillRef>
+          <a:effectRef idx="0">
+            <a:schemeClr val="dk1"/>
+          </a:effectRef>
+          <a:fontRef idx="minor">
+            <a:schemeClr val="tx1"/>
+          </a:fontRef>
+        </p:style>
+      </p:cxnSp>
+      <p:cxnSp>
+        <p:nvCxnSpPr>
+          <p:cNvPr id="24" name="Straight Connector 23">
+            <a:extLst>
+              <a:ext uri="{FF2B5EF4-FFF2-40B4-BE49-F238E27FC236}">
+                <a16:creationId xmlns:a16="http://schemas.microsoft.com/office/drawing/2014/main" id="{2D2A5562-1CF9-D22C-350C-02058D4C6EDB}"/>
+              </a:ext>
+            </a:extLst>
+          </p:cNvPr>
+          <p:cNvCxnSpPr>
+            <a:cxnSpLocks/>
+            <a:endCxn id="10" idx="0"/>
+          </p:cNvCxnSpPr>
+          <p:nvPr/>
+        </p:nvCxnSpPr>
+        <p:spPr>
+          <a:xfrm>
+            <a:off x="7507970" y="2595928"/>
+            <a:ext cx="1245668" cy="572914"/>
+          </a:xfrm>
+          <a:prstGeom prst="line">
+            <a:avLst/>
+          </a:prstGeom>
+          <a:ln w="19050">
+            <a:prstDash val="solid"/>
+          </a:ln>
+        </p:spPr>
+        <p:style>
+          <a:lnRef idx="1">
+            <a:schemeClr val="dk1"/>
+          </a:lnRef>
+          <a:fillRef idx="0">
+            <a:schemeClr val="dk1"/>
+          </a:fillRef>
+          <a:effectRef idx="0">
+            <a:schemeClr val="dk1"/>
+          </a:effectRef>
+          <a:fontRef idx="minor">
+            <a:schemeClr val="tx1"/>
+          </a:fontRef>
+        </p:style>
+      </p:cxnSp>
+      <p:cxnSp>
+        <p:nvCxnSpPr>
+          <p:cNvPr id="35" name="Straight Connector 34">
+            <a:extLst>
+              <a:ext uri="{FF2B5EF4-FFF2-40B4-BE49-F238E27FC236}">
+                <a16:creationId xmlns:a16="http://schemas.microsoft.com/office/drawing/2014/main" id="{2CA9649B-FB58-0E14-C90F-C51B1689A3A8}"/>
+              </a:ext>
+            </a:extLst>
+          </p:cNvPr>
+          <p:cNvCxnSpPr>
+            <a:cxnSpLocks/>
+          </p:cNvCxnSpPr>
+          <p:nvPr/>
+        </p:nvCxnSpPr>
+        <p:spPr>
+          <a:xfrm>
+            <a:off x="8596938" y="3568787"/>
+            <a:ext cx="0" cy="647613"/>
+          </a:xfrm>
+          <a:prstGeom prst="line">
+            <a:avLst/>
+          </a:prstGeom>
+          <a:ln w="19050">
+            <a:prstDash val="solid"/>
+          </a:ln>
+        </p:spPr>
+        <p:style>
+          <a:lnRef idx="1">
+            <a:schemeClr val="dk1"/>
+          </a:lnRef>
+          <a:fillRef idx="0">
+            <a:schemeClr val="dk1"/>
+          </a:fillRef>
+          <a:effectRef idx="0">
+            <a:schemeClr val="dk1"/>
+          </a:effectRef>
+          <a:fontRef idx="minor">
+            <a:schemeClr val="tx1"/>
+          </a:fontRef>
+        </p:style>
+      </p:cxnSp>
+      <p:sp>
+        <p:nvSpPr>
+          <p:cNvPr id="36" name="TextBox 35">
+            <a:extLst>
+              <a:ext uri="{FF2B5EF4-FFF2-40B4-BE49-F238E27FC236}">
+                <a16:creationId xmlns:a16="http://schemas.microsoft.com/office/drawing/2014/main" id="{D7DCBA9E-8785-8CF5-3870-C510211D1A0E}"/>
+              </a:ext>
+            </a:extLst>
+          </p:cNvPr>
+          <p:cNvSpPr txBox="1"/>
+          <p:nvPr/>
+        </p:nvSpPr>
+        <p:spPr>
+          <a:xfrm>
+            <a:off x="10487581" y="1442066"/>
+            <a:ext cx="1260909" cy="367477"/>
+          </a:xfrm>
+          <a:prstGeom prst="rect">
+            <a:avLst/>
+          </a:prstGeom>
+          <a:noFill/>
+        </p:spPr>
+        <p:txBody>
+          <a:bodyPr wrap="square" rtlCol="0">
+            <a:spAutoFit/>
+          </a:bodyPr>
+          <a:lstStyle/>
+          <a:p>
+            <a:r>
+              <a:rPr lang="en-US" dirty="0"/>
+              <a:t>Layer 1</a:t>
+            </a:r>
+          </a:p>
+        </p:txBody>
+      </p:sp>
+      <p:sp>
+        <p:nvSpPr>
+          <p:cNvPr id="37" name="TextBox 36">
+            <a:extLst>
+              <a:ext uri="{FF2B5EF4-FFF2-40B4-BE49-F238E27FC236}">
+                <a16:creationId xmlns:a16="http://schemas.microsoft.com/office/drawing/2014/main" id="{E6CA13CA-2C4F-4B79-C5F7-915671478136}"/>
+              </a:ext>
+            </a:extLst>
+          </p:cNvPr>
+          <p:cNvSpPr txBox="1"/>
+          <p:nvPr/>
+        </p:nvSpPr>
+        <p:spPr>
+          <a:xfrm>
+            <a:off x="10487581" y="2254866"/>
+            <a:ext cx="1260909" cy="367477"/>
+          </a:xfrm>
+          <a:prstGeom prst="rect">
+            <a:avLst/>
+          </a:prstGeom>
+          <a:noFill/>
+        </p:spPr>
+        <p:txBody>
+          <a:bodyPr wrap="square" rtlCol="0">
+            <a:spAutoFit/>
+          </a:bodyPr>
+          <a:lstStyle/>
+          <a:p>
+            <a:r>
+              <a:rPr lang="en-US" dirty="0"/>
+              <a:t>Layer 2</a:t>
+            </a:r>
+          </a:p>
+        </p:txBody>
+      </p:sp>
+      <p:sp>
+        <p:nvSpPr>
+          <p:cNvPr id="38" name="TextBox 37">
+            <a:extLst>
+              <a:ext uri="{FF2B5EF4-FFF2-40B4-BE49-F238E27FC236}">
+                <a16:creationId xmlns:a16="http://schemas.microsoft.com/office/drawing/2014/main" id="{F83B5679-D78D-76EC-5076-367DD873A3CE}"/>
+              </a:ext>
+            </a:extLst>
+          </p:cNvPr>
+          <p:cNvSpPr txBox="1"/>
+          <p:nvPr/>
+        </p:nvSpPr>
+        <p:spPr>
+          <a:xfrm>
+            <a:off x="10487581" y="3162710"/>
+            <a:ext cx="1260909" cy="367477"/>
+          </a:xfrm>
+          <a:prstGeom prst="rect">
+            <a:avLst/>
+          </a:prstGeom>
+          <a:noFill/>
+        </p:spPr>
+        <p:txBody>
+          <a:bodyPr wrap="square" rtlCol="0">
+            <a:spAutoFit/>
+          </a:bodyPr>
+          <a:lstStyle/>
+          <a:p>
+            <a:r>
+              <a:rPr lang="en-US" dirty="0"/>
+              <a:t>Layer 3</a:t>
+            </a:r>
+          </a:p>
+        </p:txBody>
+      </p:sp>
+      <p:sp>
+        <p:nvSpPr>
+          <p:cNvPr id="13" name="TextBox 12">
+            <a:extLst>
+              <a:ext uri="{FF2B5EF4-FFF2-40B4-BE49-F238E27FC236}">
+                <a16:creationId xmlns:a16="http://schemas.microsoft.com/office/drawing/2014/main" id="{449B6211-7EBD-74A2-4617-471D5CD43CDE}"/>
+              </a:ext>
+            </a:extLst>
+          </p:cNvPr>
+          <p:cNvSpPr txBox="1"/>
+          <p:nvPr/>
+        </p:nvSpPr>
+        <p:spPr>
+          <a:xfrm>
+            <a:off x="7103533" y="4219060"/>
+            <a:ext cx="3369731" cy="369332"/>
+          </a:xfrm>
+          <a:prstGeom prst="rect">
+            <a:avLst/>
+          </a:prstGeom>
+          <a:noFill/>
+        </p:spPr>
+        <p:txBody>
+          <a:bodyPr wrap="square" rtlCol="0">
+            <a:spAutoFit/>
+          </a:bodyPr>
+          <a:lstStyle/>
+          <a:p>
+            <a:r>
+              <a:rPr lang="en-US" b="1" dirty="0"/>
+              <a:t>what's that supposed to mean?</a:t>
+            </a:r>
+          </a:p>
+        </p:txBody>
+      </p:sp>
+      <p:cxnSp>
+        <p:nvCxnSpPr>
+          <p:cNvPr id="16" name="Straight Connector 15">
+            <a:extLst>
+              <a:ext uri="{FF2B5EF4-FFF2-40B4-BE49-F238E27FC236}">
+                <a16:creationId xmlns:a16="http://schemas.microsoft.com/office/drawing/2014/main" id="{2AB0E24D-3185-86FB-A0FE-6E95B1A7B610}"/>
+              </a:ext>
+            </a:extLst>
+          </p:cNvPr>
+          <p:cNvCxnSpPr>
+            <a:cxnSpLocks/>
+          </p:cNvCxnSpPr>
+          <p:nvPr/>
+        </p:nvCxnSpPr>
+        <p:spPr>
+          <a:xfrm>
+            <a:off x="8537897" y="4619005"/>
+            <a:ext cx="0" cy="647613"/>
+          </a:xfrm>
+          <a:prstGeom prst="line">
+            <a:avLst/>
+          </a:prstGeom>
+          <a:ln w="19050">
+            <a:prstDash val="solid"/>
+          </a:ln>
+        </p:spPr>
+        <p:style>
+          <a:lnRef idx="1">
+            <a:schemeClr val="dk1"/>
+          </a:lnRef>
+          <a:fillRef idx="0">
+            <a:schemeClr val="dk1"/>
+          </a:fillRef>
+          <a:effectRef idx="0">
+            <a:schemeClr val="dk1"/>
+          </a:effectRef>
+          <a:fontRef idx="minor">
+            <a:schemeClr val="tx1"/>
+          </a:fontRef>
+        </p:style>
+      </p:cxnSp>
+      <p:sp>
+        <p:nvSpPr>
+          <p:cNvPr id="18" name="TextBox 17">
+            <a:extLst>
+              <a:ext uri="{FF2B5EF4-FFF2-40B4-BE49-F238E27FC236}">
+                <a16:creationId xmlns:a16="http://schemas.microsoft.com/office/drawing/2014/main" id="{86DBF76D-35C4-AA95-A023-C3D7579337FE}"/>
+              </a:ext>
+            </a:extLst>
+          </p:cNvPr>
+          <p:cNvSpPr txBox="1"/>
+          <p:nvPr/>
+        </p:nvSpPr>
+        <p:spPr>
+          <a:xfrm>
+            <a:off x="7590619" y="5297231"/>
+            <a:ext cx="2631407" cy="369332"/>
+          </a:xfrm>
+          <a:prstGeom prst="rect">
+            <a:avLst/>
+          </a:prstGeom>
+          <a:noFill/>
+        </p:spPr>
+        <p:txBody>
+          <a:bodyPr wrap="square" rtlCol="0">
+            <a:spAutoFit/>
+          </a:bodyPr>
+          <a:lstStyle/>
+          <a:p>
+            <a:r>
+              <a:rPr lang="en-US" b="1" dirty="0"/>
+              <a:t>you're an overachiever</a:t>
+            </a:r>
+          </a:p>
+        </p:txBody>
+      </p:sp>
+      <p:cxnSp>
+        <p:nvCxnSpPr>
+          <p:cNvPr id="20" name="Straight Connector 19">
+            <a:extLst>
+              <a:ext uri="{FF2B5EF4-FFF2-40B4-BE49-F238E27FC236}">
+                <a16:creationId xmlns:a16="http://schemas.microsoft.com/office/drawing/2014/main" id="{0DB86A08-542C-C614-4283-C11B2FF92E81}"/>
+              </a:ext>
+            </a:extLst>
+          </p:cNvPr>
+          <p:cNvCxnSpPr>
+            <a:cxnSpLocks/>
+          </p:cNvCxnSpPr>
+          <p:nvPr/>
+        </p:nvCxnSpPr>
+        <p:spPr>
+          <a:xfrm>
+            <a:off x="8497356" y="5697176"/>
+            <a:ext cx="0" cy="647613"/>
+          </a:xfrm>
+          <a:prstGeom prst="line">
+            <a:avLst/>
+          </a:prstGeom>
+          <a:ln w="19050">
+            <a:prstDash val="solid"/>
+          </a:ln>
+        </p:spPr>
+        <p:style>
+          <a:lnRef idx="1">
+            <a:schemeClr val="dk1"/>
+          </a:lnRef>
+          <a:fillRef idx="0">
+            <a:schemeClr val="dk1"/>
+          </a:fillRef>
+          <a:effectRef idx="0">
+            <a:schemeClr val="dk1"/>
+          </a:effectRef>
+          <a:fontRef idx="minor">
+            <a:schemeClr val="tx1"/>
+          </a:fontRef>
+        </p:style>
+      </p:cxnSp>
+      <p:grpSp>
+        <p:nvGrpSpPr>
+          <p:cNvPr id="40" name="Group 39">
+            <a:extLst>
+              <a:ext uri="{FF2B5EF4-FFF2-40B4-BE49-F238E27FC236}">
+                <a16:creationId xmlns:a16="http://schemas.microsoft.com/office/drawing/2014/main" id="{1D8BCD1E-3205-D1FA-17A2-32D8F1A1DB88}"/>
+              </a:ext>
+            </a:extLst>
+          </p:cNvPr>
+          <p:cNvGrpSpPr/>
+          <p:nvPr/>
+        </p:nvGrpSpPr>
+        <p:grpSpPr>
+          <a:xfrm>
+            <a:off x="465221" y="2086756"/>
+            <a:ext cx="11100487" cy="3909083"/>
+            <a:chOff x="3145628" y="2086756"/>
+            <a:chExt cx="7175983" cy="3909083"/>
+          </a:xfrm>
+        </p:grpSpPr>
+        <p:cxnSp>
+          <p:nvCxnSpPr>
+            <p:cNvPr id="39" name="Straight Connector 38">
+              <a:extLst>
+                <a:ext uri="{FF2B5EF4-FFF2-40B4-BE49-F238E27FC236}">
+                  <a16:creationId xmlns:a16="http://schemas.microsoft.com/office/drawing/2014/main" id="{F3F79CE0-AD69-1922-E159-EA9B2FB3F224}"/>
+                </a:ext>
+              </a:extLst>
+            </p:cNvPr>
+            <p:cNvCxnSpPr>
+              <a:cxnSpLocks/>
+            </p:cNvCxnSpPr>
+            <p:nvPr/>
+          </p:nvCxnSpPr>
+          <p:spPr>
+            <a:xfrm flipH="1">
+              <a:off x="3145628" y="2863137"/>
+              <a:ext cx="7076401" cy="15727"/>
+            </a:xfrm>
+            <a:prstGeom prst="line">
+              <a:avLst/>
+            </a:prstGeom>
+            <a:ln w="19050">
+              <a:solidFill>
+                <a:schemeClr val="dk1">
+                  <a:alpha val="25000"/>
+                </a:schemeClr>
+              </a:solidFill>
+              <a:prstDash val="dash"/>
+            </a:ln>
+          </p:spPr>
+          <p:style>
+            <a:lnRef idx="1">
+              <a:schemeClr val="dk1"/>
+            </a:lnRef>
+            <a:fillRef idx="0">
+              <a:schemeClr val="dk1"/>
+            </a:fillRef>
+            <a:effectRef idx="0">
+              <a:schemeClr val="dk1"/>
+            </a:effectRef>
+            <a:fontRef idx="minor">
+              <a:schemeClr val="tx1"/>
+            </a:fontRef>
+          </p:style>
+        </p:cxnSp>
+        <p:cxnSp>
+          <p:nvCxnSpPr>
+            <p:cNvPr id="44" name="Straight Connector 43">
+              <a:extLst>
+                <a:ext uri="{FF2B5EF4-FFF2-40B4-BE49-F238E27FC236}">
+                  <a16:creationId xmlns:a16="http://schemas.microsoft.com/office/drawing/2014/main" id="{F4F59759-D8E9-F8DA-EE3D-2677876E3E01}"/>
+                </a:ext>
+              </a:extLst>
+            </p:cNvPr>
+            <p:cNvCxnSpPr>
+              <a:cxnSpLocks/>
+            </p:cNvCxnSpPr>
+            <p:nvPr/>
+          </p:nvCxnSpPr>
+          <p:spPr>
+            <a:xfrm flipH="1">
+              <a:off x="3245210" y="3851723"/>
+              <a:ext cx="7076401" cy="15727"/>
+            </a:xfrm>
+            <a:prstGeom prst="line">
+              <a:avLst/>
+            </a:prstGeom>
+            <a:ln w="19050">
+              <a:solidFill>
+                <a:schemeClr val="dk1">
+                  <a:alpha val="25000"/>
+                </a:schemeClr>
+              </a:solidFill>
+              <a:prstDash val="dash"/>
+            </a:ln>
+          </p:spPr>
+          <p:style>
+            <a:lnRef idx="1">
+              <a:schemeClr val="dk1"/>
+            </a:lnRef>
+            <a:fillRef idx="0">
+              <a:schemeClr val="dk1"/>
+            </a:fillRef>
+            <a:effectRef idx="0">
+              <a:schemeClr val="dk1"/>
+            </a:effectRef>
+            <a:fontRef idx="minor">
+              <a:schemeClr val="tx1"/>
+            </a:fontRef>
+          </p:style>
+        </p:cxnSp>
+        <p:cxnSp>
+          <p:nvCxnSpPr>
+            <p:cNvPr id="45" name="Straight Connector 44">
+              <a:extLst>
+                <a:ext uri="{FF2B5EF4-FFF2-40B4-BE49-F238E27FC236}">
+                  <a16:creationId xmlns:a16="http://schemas.microsoft.com/office/drawing/2014/main" id="{677E36B4-602E-C5CB-78BE-4BCE210877AA}"/>
+                </a:ext>
+              </a:extLst>
+            </p:cNvPr>
+            <p:cNvCxnSpPr>
+              <a:cxnSpLocks/>
+            </p:cNvCxnSpPr>
+            <p:nvPr/>
+          </p:nvCxnSpPr>
+          <p:spPr>
+            <a:xfrm flipH="1">
+              <a:off x="3186169" y="2086756"/>
+              <a:ext cx="7076401" cy="15727"/>
+            </a:xfrm>
+            <a:prstGeom prst="line">
+              <a:avLst/>
+            </a:prstGeom>
+            <a:ln w="19050">
+              <a:solidFill>
+                <a:schemeClr val="dk1">
+                  <a:alpha val="25000"/>
+                </a:schemeClr>
+              </a:solidFill>
+              <a:prstDash val="dash"/>
+            </a:ln>
+          </p:spPr>
+          <p:style>
+            <a:lnRef idx="1">
+              <a:schemeClr val="dk1"/>
+            </a:lnRef>
+            <a:fillRef idx="0">
+              <a:schemeClr val="dk1"/>
+            </a:fillRef>
+            <a:effectRef idx="0">
+              <a:schemeClr val="dk1"/>
+            </a:effectRef>
+            <a:fontRef idx="minor">
+              <a:schemeClr val="tx1"/>
+            </a:fontRef>
+          </p:style>
+        </p:cxnSp>
+        <p:cxnSp>
+          <p:nvCxnSpPr>
+            <p:cNvPr id="17" name="Straight Connector 16">
+              <a:extLst>
+                <a:ext uri="{FF2B5EF4-FFF2-40B4-BE49-F238E27FC236}">
+                  <a16:creationId xmlns:a16="http://schemas.microsoft.com/office/drawing/2014/main" id="{881A8049-CACC-71BB-FE60-53535B6A2B38}"/>
+                </a:ext>
+              </a:extLst>
+            </p:cNvPr>
+            <p:cNvCxnSpPr>
+              <a:cxnSpLocks/>
+            </p:cNvCxnSpPr>
+            <p:nvPr/>
+          </p:nvCxnSpPr>
+          <p:spPr>
+            <a:xfrm flipH="1">
+              <a:off x="3186169" y="4901941"/>
+              <a:ext cx="7076401" cy="15727"/>
+            </a:xfrm>
+            <a:prstGeom prst="line">
+              <a:avLst/>
+            </a:prstGeom>
+            <a:ln w="19050">
+              <a:solidFill>
+                <a:schemeClr val="dk1">
+                  <a:alpha val="25000"/>
+                </a:schemeClr>
+              </a:solidFill>
+              <a:prstDash val="dash"/>
+            </a:ln>
+          </p:spPr>
+          <p:style>
+            <a:lnRef idx="1">
+              <a:schemeClr val="dk1"/>
+            </a:lnRef>
+            <a:fillRef idx="0">
+              <a:schemeClr val="dk1"/>
+            </a:fillRef>
+            <a:effectRef idx="0">
+              <a:schemeClr val="dk1"/>
+            </a:effectRef>
+            <a:fontRef idx="minor">
+              <a:schemeClr val="tx1"/>
+            </a:fontRef>
+          </p:style>
+        </p:cxnSp>
+        <p:cxnSp>
+          <p:nvCxnSpPr>
+            <p:cNvPr id="21" name="Straight Connector 20">
+              <a:extLst>
+                <a:ext uri="{FF2B5EF4-FFF2-40B4-BE49-F238E27FC236}">
+                  <a16:creationId xmlns:a16="http://schemas.microsoft.com/office/drawing/2014/main" id="{8E815B7D-F362-81DF-FB42-F2EF7DCCA858}"/>
+                </a:ext>
+              </a:extLst>
+            </p:cNvPr>
+            <p:cNvCxnSpPr>
+              <a:cxnSpLocks/>
+            </p:cNvCxnSpPr>
+            <p:nvPr/>
+          </p:nvCxnSpPr>
+          <p:spPr>
+            <a:xfrm flipH="1">
+              <a:off x="3145628" y="5980112"/>
+              <a:ext cx="7076401" cy="15727"/>
+            </a:xfrm>
+            <a:prstGeom prst="line">
+              <a:avLst/>
+            </a:prstGeom>
+            <a:ln w="19050">
+              <a:solidFill>
+                <a:schemeClr val="dk1">
+                  <a:alpha val="25000"/>
+                </a:schemeClr>
+              </a:solidFill>
+              <a:prstDash val="dash"/>
+            </a:ln>
+          </p:spPr>
+          <p:style>
+            <a:lnRef idx="1">
+              <a:schemeClr val="dk1"/>
+            </a:lnRef>
+            <a:fillRef idx="0">
+              <a:schemeClr val="dk1"/>
+            </a:fillRef>
+            <a:effectRef idx="0">
+              <a:schemeClr val="dk1"/>
+            </a:effectRef>
+            <a:fontRef idx="minor">
+              <a:schemeClr val="tx1"/>
+            </a:fontRef>
+          </p:style>
+        </p:cxnSp>
+      </p:grpSp>
+      <p:sp>
+        <p:nvSpPr>
+          <p:cNvPr id="23" name="TextBox 22">
+            <a:extLst>
+              <a:ext uri="{FF2B5EF4-FFF2-40B4-BE49-F238E27FC236}">
+                <a16:creationId xmlns:a16="http://schemas.microsoft.com/office/drawing/2014/main" id="{0C66C993-C0B2-4645-25E9-C27658706A10}"/>
+              </a:ext>
+            </a:extLst>
+          </p:cNvPr>
+          <p:cNvSpPr txBox="1"/>
+          <p:nvPr/>
+        </p:nvSpPr>
+        <p:spPr>
+          <a:xfrm>
+            <a:off x="7533501" y="6309388"/>
+            <a:ext cx="2126873" cy="369332"/>
+          </a:xfrm>
+          <a:prstGeom prst="rect">
+            <a:avLst/>
+          </a:prstGeom>
+          <a:noFill/>
+        </p:spPr>
+        <p:txBody>
+          <a:bodyPr wrap="square" rtlCol="0">
+            <a:spAutoFit/>
+          </a:bodyPr>
+          <a:lstStyle/>
+          <a:p>
+            <a:r>
+              <a:rPr lang="en-US" b="1" dirty="0"/>
+              <a:t>and that's bad how?</a:t>
+            </a:r>
+          </a:p>
+        </p:txBody>
+      </p:sp>
+      <p:sp>
+        <p:nvSpPr>
+          <p:cNvPr id="41" name="TextBox 40">
+            <a:extLst>
+              <a:ext uri="{FF2B5EF4-FFF2-40B4-BE49-F238E27FC236}">
+                <a16:creationId xmlns:a16="http://schemas.microsoft.com/office/drawing/2014/main" id="{7E17D979-D248-075B-1F7E-934C308D978C}"/>
+              </a:ext>
+            </a:extLst>
+          </p:cNvPr>
+          <p:cNvSpPr txBox="1"/>
+          <p:nvPr/>
+        </p:nvSpPr>
+        <p:spPr>
+          <a:xfrm>
+            <a:off x="10473264" y="4214933"/>
+            <a:ext cx="1260909" cy="367477"/>
+          </a:xfrm>
+          <a:prstGeom prst="rect">
+            <a:avLst/>
+          </a:prstGeom>
+          <a:noFill/>
+        </p:spPr>
+        <p:txBody>
+          <a:bodyPr wrap="square" rtlCol="0">
+            <a:spAutoFit/>
+          </a:bodyPr>
+          <a:lstStyle/>
+          <a:p>
+            <a:r>
+              <a:rPr lang="en-US" dirty="0"/>
+              <a:t>Layer 4</a:t>
+            </a:r>
+          </a:p>
+        </p:txBody>
+      </p:sp>
+      <p:sp>
+        <p:nvSpPr>
+          <p:cNvPr id="42" name="TextBox 41">
+            <a:extLst>
+              <a:ext uri="{FF2B5EF4-FFF2-40B4-BE49-F238E27FC236}">
+                <a16:creationId xmlns:a16="http://schemas.microsoft.com/office/drawing/2014/main" id="{8071FD39-316E-EED1-84B3-4359739DEF11}"/>
+              </a:ext>
+            </a:extLst>
+          </p:cNvPr>
+          <p:cNvSpPr txBox="1"/>
+          <p:nvPr/>
+        </p:nvSpPr>
+        <p:spPr>
+          <a:xfrm>
+            <a:off x="10473263" y="5297231"/>
+            <a:ext cx="1260909" cy="367477"/>
+          </a:xfrm>
+          <a:prstGeom prst="rect">
+            <a:avLst/>
+          </a:prstGeom>
+          <a:noFill/>
+        </p:spPr>
+        <p:txBody>
+          <a:bodyPr wrap="square" rtlCol="0">
+            <a:spAutoFit/>
+          </a:bodyPr>
+          <a:lstStyle/>
+          <a:p>
+            <a:r>
+              <a:rPr lang="en-US" dirty="0"/>
+              <a:t>Layer 5</a:t>
+            </a:r>
+          </a:p>
+        </p:txBody>
+      </p:sp>
+      <p:sp>
+        <p:nvSpPr>
+          <p:cNvPr id="43" name="TextBox 42">
+            <a:extLst>
+              <a:ext uri="{FF2B5EF4-FFF2-40B4-BE49-F238E27FC236}">
+                <a16:creationId xmlns:a16="http://schemas.microsoft.com/office/drawing/2014/main" id="{E19F1CFE-B9CA-C202-9DA6-760C4D8A80CD}"/>
+              </a:ext>
+            </a:extLst>
+          </p:cNvPr>
+          <p:cNvSpPr txBox="1"/>
+          <p:nvPr/>
+        </p:nvSpPr>
+        <p:spPr>
+          <a:xfrm>
+            <a:off x="10473262" y="6305428"/>
+            <a:ext cx="1260909" cy="367477"/>
+          </a:xfrm>
+          <a:prstGeom prst="rect">
+            <a:avLst/>
+          </a:prstGeom>
+          <a:noFill/>
+        </p:spPr>
+        <p:txBody>
+          <a:bodyPr wrap="square" rtlCol="0">
+            <a:spAutoFit/>
+          </a:bodyPr>
+          <a:lstStyle/>
+          <a:p>
+            <a:r>
+              <a:rPr lang="en-US" dirty="0"/>
+              <a:t>Layer 6</a:t>
+            </a:r>
+          </a:p>
+        </p:txBody>
+      </p:sp>
+      <p:sp>
+        <p:nvSpPr>
+          <p:cNvPr id="3" name="TextBox 2">
+            <a:extLst>
+              <a:ext uri="{FF2B5EF4-FFF2-40B4-BE49-F238E27FC236}">
+                <a16:creationId xmlns:a16="http://schemas.microsoft.com/office/drawing/2014/main" id="{F1CE07A4-9C89-261C-B45A-87BFDCB7D9D6}"/>
+              </a:ext>
+            </a:extLst>
+          </p:cNvPr>
+          <p:cNvSpPr txBox="1"/>
+          <p:nvPr/>
+        </p:nvSpPr>
+        <p:spPr>
+          <a:xfrm>
+            <a:off x="5110097" y="890552"/>
+            <a:ext cx="1307956" cy="369332"/>
+          </a:xfrm>
+          <a:prstGeom prst="rect">
+            <a:avLst/>
+          </a:prstGeom>
+          <a:noFill/>
+        </p:spPr>
+        <p:txBody>
+          <a:bodyPr wrap="square">
+            <a:spAutoFit/>
+          </a:bodyPr>
+          <a:lstStyle/>
+          <a:p>
+            <a:r>
+              <a:rPr lang="en-US" dirty="0"/>
+              <a:t>98778587</a:t>
+            </a:r>
+          </a:p>
+        </p:txBody>
+      </p:sp>
+      <p:sp>
+        <p:nvSpPr>
+          <p:cNvPr id="11" name="TextBox 10">
+            <a:extLst>
+              <a:ext uri="{FF2B5EF4-FFF2-40B4-BE49-F238E27FC236}">
+                <a16:creationId xmlns:a16="http://schemas.microsoft.com/office/drawing/2014/main" id="{7BD33985-0A90-B1E9-DF9F-FF251195B11D}"/>
+              </a:ext>
+            </a:extLst>
+          </p:cNvPr>
+          <p:cNvSpPr txBox="1"/>
+          <p:nvPr/>
+        </p:nvSpPr>
+        <p:spPr>
+          <a:xfrm>
+            <a:off x="1587087" y="2036063"/>
+            <a:ext cx="1307956" cy="369332"/>
+          </a:xfrm>
+          <a:prstGeom prst="rect">
+            <a:avLst/>
+          </a:prstGeom>
+          <a:noFill/>
+        </p:spPr>
+        <p:txBody>
+          <a:bodyPr wrap="square">
+            <a:spAutoFit/>
+          </a:bodyPr>
+          <a:lstStyle/>
+          <a:p>
+            <a:r>
+              <a:rPr lang="en-US" dirty="0"/>
+              <a:t>24345</a:t>
+            </a:r>
+          </a:p>
+        </p:txBody>
+      </p:sp>
+      <p:sp>
+        <p:nvSpPr>
+          <p:cNvPr id="25" name="TextBox 24">
+            <a:extLst>
+              <a:ext uri="{FF2B5EF4-FFF2-40B4-BE49-F238E27FC236}">
+                <a16:creationId xmlns:a16="http://schemas.microsoft.com/office/drawing/2014/main" id="{BFB64509-2DFB-D295-5EDD-CE460D05D6F1}"/>
+              </a:ext>
+            </a:extLst>
+          </p:cNvPr>
+          <p:cNvSpPr txBox="1"/>
+          <p:nvPr/>
+        </p:nvSpPr>
+        <p:spPr>
+          <a:xfrm>
+            <a:off x="7702585" y="2053967"/>
+            <a:ext cx="1307956" cy="369332"/>
+          </a:xfrm>
+          <a:prstGeom prst="rect">
+            <a:avLst/>
+          </a:prstGeom>
+          <a:noFill/>
+        </p:spPr>
+        <p:txBody>
+          <a:bodyPr wrap="square">
+            <a:spAutoFit/>
+          </a:bodyPr>
+          <a:lstStyle/>
+          <a:p>
+            <a:r>
+              <a:rPr lang="en-US" dirty="0"/>
+              <a:t>267445</a:t>
+            </a:r>
+          </a:p>
+        </p:txBody>
+      </p:sp>
+      <p:sp>
+        <p:nvSpPr>
+          <p:cNvPr id="26" name="TextBox 25">
+            <a:extLst>
+              <a:ext uri="{FF2B5EF4-FFF2-40B4-BE49-F238E27FC236}">
+                <a16:creationId xmlns:a16="http://schemas.microsoft.com/office/drawing/2014/main" id="{C6D31C49-B094-4166-7381-E587D32C338B}"/>
+              </a:ext>
+            </a:extLst>
+          </p:cNvPr>
+          <p:cNvSpPr txBox="1"/>
+          <p:nvPr/>
+        </p:nvSpPr>
+        <p:spPr>
+          <a:xfrm>
+            <a:off x="6370326" y="2972901"/>
+            <a:ext cx="1307956" cy="369332"/>
+          </a:xfrm>
+          <a:prstGeom prst="rect">
+            <a:avLst/>
+          </a:prstGeom>
+          <a:noFill/>
+        </p:spPr>
+        <p:txBody>
+          <a:bodyPr wrap="square">
+            <a:spAutoFit/>
+          </a:bodyPr>
+          <a:lstStyle/>
+          <a:p>
+            <a:r>
+              <a:rPr lang="en-US" dirty="0"/>
+              <a:t>32124</a:t>
+            </a:r>
+          </a:p>
+        </p:txBody>
+      </p:sp>
+      <p:sp>
+        <p:nvSpPr>
+          <p:cNvPr id="27" name="TextBox 26">
+            <a:extLst>
+              <a:ext uri="{FF2B5EF4-FFF2-40B4-BE49-F238E27FC236}">
+                <a16:creationId xmlns:a16="http://schemas.microsoft.com/office/drawing/2014/main" id="{790F060C-B4B7-A185-7448-667C6BD04857}"/>
+              </a:ext>
+            </a:extLst>
+          </p:cNvPr>
+          <p:cNvSpPr txBox="1"/>
+          <p:nvPr/>
+        </p:nvSpPr>
+        <p:spPr>
+          <a:xfrm>
+            <a:off x="8829052" y="2943931"/>
+            <a:ext cx="1307956" cy="369332"/>
+          </a:xfrm>
+          <a:prstGeom prst="rect">
+            <a:avLst/>
+          </a:prstGeom>
+          <a:noFill/>
+        </p:spPr>
+        <p:txBody>
+          <a:bodyPr wrap="square">
+            <a:spAutoFit/>
+          </a:bodyPr>
+          <a:lstStyle/>
+          <a:p>
+            <a:r>
+              <a:rPr lang="en-US" dirty="0"/>
+              <a:t>34546</a:t>
+            </a:r>
+          </a:p>
+        </p:txBody>
+      </p:sp>
+      <p:sp>
+        <p:nvSpPr>
+          <p:cNvPr id="28" name="TextBox 27">
+            <a:extLst>
+              <a:ext uri="{FF2B5EF4-FFF2-40B4-BE49-F238E27FC236}">
+                <a16:creationId xmlns:a16="http://schemas.microsoft.com/office/drawing/2014/main" id="{680D7A76-6CBA-8416-94D3-0AE97DAB8442}"/>
+              </a:ext>
+            </a:extLst>
+          </p:cNvPr>
+          <p:cNvSpPr txBox="1"/>
+          <p:nvPr/>
+        </p:nvSpPr>
+        <p:spPr>
+          <a:xfrm>
+            <a:off x="8829052" y="3982217"/>
+            <a:ext cx="1307956" cy="369332"/>
+          </a:xfrm>
+          <a:prstGeom prst="rect">
+            <a:avLst/>
+          </a:prstGeom>
+          <a:noFill/>
+        </p:spPr>
+        <p:txBody>
+          <a:bodyPr wrap="square">
+            <a:spAutoFit/>
+          </a:bodyPr>
+          <a:lstStyle/>
+          <a:p>
+            <a:r>
+              <a:rPr lang="en-US" dirty="0"/>
+              <a:t>4354</a:t>
+            </a:r>
+          </a:p>
+        </p:txBody>
+      </p:sp>
+      <p:sp>
+        <p:nvSpPr>
+          <p:cNvPr id="29" name="TextBox 28">
+            <a:extLst>
+              <a:ext uri="{FF2B5EF4-FFF2-40B4-BE49-F238E27FC236}">
+                <a16:creationId xmlns:a16="http://schemas.microsoft.com/office/drawing/2014/main" id="{9FC84DDD-1F95-6F8C-E823-FCBD735D8F29}"/>
+              </a:ext>
+            </a:extLst>
+          </p:cNvPr>
+          <p:cNvSpPr txBox="1"/>
+          <p:nvPr/>
+        </p:nvSpPr>
+        <p:spPr>
+          <a:xfrm>
+            <a:off x="8829052" y="5061332"/>
+            <a:ext cx="1307956" cy="369332"/>
+          </a:xfrm>
+          <a:prstGeom prst="rect">
+            <a:avLst/>
+          </a:prstGeom>
+          <a:noFill/>
+        </p:spPr>
+        <p:txBody>
+          <a:bodyPr wrap="square">
+            <a:spAutoFit/>
+          </a:bodyPr>
+          <a:lstStyle/>
+          <a:p>
+            <a:r>
+              <a:rPr lang="en-US" dirty="0"/>
+              <a:t>57533</a:t>
+            </a:r>
+          </a:p>
+        </p:txBody>
+      </p:sp>
+      <p:sp>
+        <p:nvSpPr>
+          <p:cNvPr id="30" name="TextBox 29">
+            <a:extLst>
+              <a:ext uri="{FF2B5EF4-FFF2-40B4-BE49-F238E27FC236}">
+                <a16:creationId xmlns:a16="http://schemas.microsoft.com/office/drawing/2014/main" id="{DC1ED751-DEEB-DC00-0444-A90F4642053C}"/>
+              </a:ext>
+            </a:extLst>
+          </p:cNvPr>
+          <p:cNvSpPr txBox="1"/>
+          <p:nvPr/>
+        </p:nvSpPr>
+        <p:spPr>
+          <a:xfrm>
+            <a:off x="8753637" y="6007371"/>
+            <a:ext cx="1307956" cy="369332"/>
+          </a:xfrm>
+          <a:prstGeom prst="rect">
+            <a:avLst/>
+          </a:prstGeom>
+          <a:noFill/>
+        </p:spPr>
+        <p:txBody>
+          <a:bodyPr wrap="square">
+            <a:spAutoFit/>
+          </a:bodyPr>
+          <a:lstStyle/>
+          <a:p>
+            <a:r>
+              <a:rPr lang="en-US" dirty="0"/>
+              <a:t>67644</a:t>
+            </a:r>
+          </a:p>
+        </p:txBody>
+      </p:sp>
+    </p:spTree>
+    <p:extLst>
+      <p:ext uri="{BB962C8B-B14F-4D97-AF65-F5344CB8AC3E}">
+        <p14:creationId xmlns:p14="http://schemas.microsoft.com/office/powerpoint/2010/main" val="2860912267"/>
+      </p:ext>
+    </p:extLst>
+  </p:cSld>
+  <p:clrMapOvr>
+    <a:masterClrMapping/>
+  </p:clrMapOvr>
+</p:sld>
+</file>
+
 <file path=ppt/theme/theme1.xml><?xml version="1.0" encoding="utf-8"?>
 <a:theme xmlns:a="http://schemas.openxmlformats.org/drawingml/2006/main" name="Office Theme">
   <a:themeElements>

</xml_diff>